<commit_message>
Typo - Update images
</commit_message>
<xml_diff>
--- a/images/mvi-mosby3/MviPresenterFlow.pptx
+++ b/images/mvi-mosby3/MviPresenterFlow.pptx
@@ -8,6 +8,7 @@
     <p:sldId id="256" r:id="rId2"/>
     <p:sldId id="257" r:id="rId3"/>
     <p:sldId id="258" r:id="rId4"/>
+    <p:sldId id="259" r:id="rId5"/>
   </p:sldIdLst>
   <p:sldSz cx="9144000" cy="6858000" type="screen4x3"/>
   <p:notesSz cx="6858000" cy="9144000"/>
@@ -4062,7 +4063,7 @@
             <a:pPr algn="ctr"/>
             <a:r>
               <a:rPr lang="en-US" sz="2400" b="1"/>
-              <a:t>Presenter 2</a:t>
+              <a:t>Presenter 3</a:t>
             </a:r>
           </a:p>
         </p:txBody>
@@ -4680,7 +4681,7 @@
             <a:pPr algn="ctr"/>
             <a:r>
               <a:rPr lang="en-US" sz="2400" b="1"/>
-              <a:t>Presenter 2</a:t>
+              <a:t>Presenter 3</a:t>
             </a:r>
           </a:p>
         </p:txBody>
@@ -5201,6 +5202,444 @@
     <p:extLst>
       <p:ext uri="{BB962C8B-B14F-4D97-AF65-F5344CB8AC3E}">
         <p14:creationId xmlns:p14="http://schemas.microsoft.com/office/powerpoint/2010/main" val="1602226692"/>
+      </p:ext>
+    </p:extLst>
+  </p:cSld>
+  <p:clrMapOvr>
+    <a:masterClrMapping/>
+  </p:clrMapOvr>
+</p:sld>
+</file>
+
+<file path=ppt/slides/slide4.xml><?xml version="1.0" encoding="utf-8"?>
+<p:sld xmlns:a="http://schemas.openxmlformats.org/drawingml/2006/main" xmlns:r="http://schemas.openxmlformats.org/officeDocument/2006/relationships" xmlns:p="http://schemas.openxmlformats.org/presentationml/2006/main">
+  <p:cSld>
+    <p:spTree>
+      <p:nvGrpSpPr>
+        <p:cNvPr id="1" name=""/>
+        <p:cNvGrpSpPr/>
+        <p:nvPr/>
+      </p:nvGrpSpPr>
+      <p:grpSpPr>
+        <a:xfrm>
+          <a:off x="0" y="0"/>
+          <a:ext cx="0" cy="0"/>
+          <a:chOff x="0" y="0"/>
+          <a:chExt cx="0" cy="0"/>
+        </a:xfrm>
+      </p:grpSpPr>
+      <p:sp>
+        <p:nvSpPr>
+          <p:cNvPr id="5" name="Rectangle 4"/>
+          <p:cNvSpPr/>
+          <p:nvPr/>
+        </p:nvSpPr>
+        <p:spPr>
+          <a:xfrm>
+            <a:off x="6829777" y="1876777"/>
+            <a:ext cx="1543756" cy="1521178"/>
+          </a:xfrm>
+          <a:prstGeom prst="rect">
+            <a:avLst/>
+          </a:prstGeom>
+        </p:spPr>
+        <p:style>
+          <a:lnRef idx="1">
+            <a:schemeClr val="accent5"/>
+          </a:lnRef>
+          <a:fillRef idx="2">
+            <a:schemeClr val="accent5"/>
+          </a:fillRef>
+          <a:effectRef idx="1">
+            <a:schemeClr val="accent5"/>
+          </a:effectRef>
+          <a:fontRef idx="minor">
+            <a:schemeClr val="dk1"/>
+          </a:fontRef>
+        </p:style>
+        <p:txBody>
+          <a:bodyPr rtlCol="0" anchor="ctr"/>
+          <a:lstStyle/>
+          <a:p>
+            <a:pPr algn="ctr"/>
+            <a:r>
+              <a:rPr lang="en-US" b="1"/>
+              <a:t>Shopping</a:t>
+            </a:r>
+          </a:p>
+          <a:p>
+            <a:pPr algn="ctr"/>
+            <a:r>
+              <a:rPr lang="en-US" b="1"/>
+              <a:t>Cart</a:t>
+            </a:r>
+            <a:endParaRPr lang="en-US" b="1"/>
+          </a:p>
+        </p:txBody>
+      </p:sp>
+      <p:sp>
+        <p:nvSpPr>
+          <p:cNvPr id="6" name="Rectangle 5"/>
+          <p:cNvSpPr/>
+          <p:nvPr/>
+        </p:nvSpPr>
+        <p:spPr>
+          <a:xfrm>
+            <a:off x="3132664" y="1876776"/>
+            <a:ext cx="2252135" cy="564445"/>
+          </a:xfrm>
+          <a:prstGeom prst="rect">
+            <a:avLst/>
+          </a:prstGeom>
+        </p:spPr>
+        <p:style>
+          <a:lnRef idx="1">
+            <a:schemeClr val="accent6"/>
+          </a:lnRef>
+          <a:fillRef idx="2">
+            <a:schemeClr val="accent6"/>
+          </a:fillRef>
+          <a:effectRef idx="1">
+            <a:schemeClr val="accent6"/>
+          </a:effectRef>
+          <a:fontRef idx="minor">
+            <a:schemeClr val="dk1"/>
+          </a:fontRef>
+        </p:style>
+        <p:txBody>
+          <a:bodyPr rtlCol="0" anchor="ctr"/>
+          <a:lstStyle/>
+          <a:p>
+            <a:pPr algn="ctr"/>
+            <a:r>
+              <a:rPr lang="en-US" sz="1400" b="1"/>
+              <a:t>ShoppingBasketPresenter</a:t>
+            </a:r>
+            <a:endParaRPr lang="en-US" sz="2000" b="1"/>
+          </a:p>
+        </p:txBody>
+      </p:sp>
+      <p:sp>
+        <p:nvSpPr>
+          <p:cNvPr id="8" name="Rectangle 7"/>
+          <p:cNvSpPr/>
+          <p:nvPr/>
+        </p:nvSpPr>
+        <p:spPr>
+          <a:xfrm>
+            <a:off x="3132664" y="2833509"/>
+            <a:ext cx="2252135" cy="564445"/>
+          </a:xfrm>
+          <a:prstGeom prst="rect">
+            <a:avLst/>
+          </a:prstGeom>
+        </p:spPr>
+        <p:style>
+          <a:lnRef idx="1">
+            <a:schemeClr val="accent6"/>
+          </a:lnRef>
+          <a:fillRef idx="2">
+            <a:schemeClr val="accent6"/>
+          </a:fillRef>
+          <a:effectRef idx="1">
+            <a:schemeClr val="accent6"/>
+          </a:effectRef>
+          <a:fontRef idx="minor">
+            <a:schemeClr val="dk1"/>
+          </a:fontRef>
+        </p:style>
+        <p:txBody>
+          <a:bodyPr rtlCol="0" anchor="ctr"/>
+          <a:lstStyle/>
+          <a:p>
+            <a:pPr algn="ctr"/>
+            <a:r>
+              <a:rPr lang="en-US" sz="1400" b="1"/>
+              <a:t>SelectedCountPresenter</a:t>
+            </a:r>
+          </a:p>
+        </p:txBody>
+      </p:sp>
+      <p:sp>
+        <p:nvSpPr>
+          <p:cNvPr id="10" name="Rectangle 9"/>
+          <p:cNvSpPr/>
+          <p:nvPr/>
+        </p:nvSpPr>
+        <p:spPr>
+          <a:xfrm>
+            <a:off x="881944" y="1874789"/>
+            <a:ext cx="1340556" cy="564445"/>
+          </a:xfrm>
+          <a:prstGeom prst="rect">
+            <a:avLst/>
+          </a:prstGeom>
+        </p:spPr>
+        <p:style>
+          <a:lnRef idx="1">
+            <a:schemeClr val="accent3"/>
+          </a:lnRef>
+          <a:fillRef idx="2">
+            <a:schemeClr val="accent3"/>
+          </a:fillRef>
+          <a:effectRef idx="1">
+            <a:schemeClr val="accent3"/>
+          </a:effectRef>
+          <a:fontRef idx="minor">
+            <a:schemeClr val="dk1"/>
+          </a:fontRef>
+        </p:style>
+        <p:txBody>
+          <a:bodyPr rtlCol="0" anchor="ctr"/>
+          <a:lstStyle/>
+          <a:p>
+            <a:pPr algn="ctr"/>
+            <a:r>
+              <a:rPr lang="en-US" sz="1600" b="1"/>
+              <a:t>Toolbar</a:t>
+            </a:r>
+          </a:p>
+        </p:txBody>
+      </p:sp>
+      <p:sp>
+        <p:nvSpPr>
+          <p:cNvPr id="11" name="Rectangle 10"/>
+          <p:cNvSpPr/>
+          <p:nvPr/>
+        </p:nvSpPr>
+        <p:spPr>
+          <a:xfrm>
+            <a:off x="881944" y="2833509"/>
+            <a:ext cx="1340556" cy="564445"/>
+          </a:xfrm>
+          <a:prstGeom prst="rect">
+            <a:avLst/>
+          </a:prstGeom>
+        </p:spPr>
+        <p:style>
+          <a:lnRef idx="1">
+            <a:schemeClr val="accent3"/>
+          </a:lnRef>
+          <a:fillRef idx="2">
+            <a:schemeClr val="accent3"/>
+          </a:fillRef>
+          <a:effectRef idx="1">
+            <a:schemeClr val="accent3"/>
+          </a:effectRef>
+          <a:fontRef idx="minor">
+            <a:schemeClr val="dk1"/>
+          </a:fontRef>
+        </p:style>
+        <p:txBody>
+          <a:bodyPr rtlCol="0" anchor="ctr"/>
+          <a:lstStyle/>
+          <a:p>
+            <a:pPr algn="ctr"/>
+            <a:r>
+              <a:rPr lang="en-US" sz="1600" b="1"/>
+              <a:t>RececlerView</a:t>
+            </a:r>
+          </a:p>
+        </p:txBody>
+      </p:sp>
+      <p:cxnSp>
+        <p:nvCxnSpPr>
+          <p:cNvPr id="13" name="Straight Arrow Connector 12"/>
+          <p:cNvCxnSpPr/>
+          <p:nvPr/>
+        </p:nvCxnSpPr>
+        <p:spPr>
+          <a:xfrm flipV="1">
+            <a:off x="5497688" y="2187222"/>
+            <a:ext cx="1199444" cy="1"/>
+          </a:xfrm>
+          <a:prstGeom prst="straightConnector1">
+            <a:avLst/>
+          </a:prstGeom>
+          <a:ln>
+            <a:prstDash val="dash"/>
+            <a:tailEnd type="arrow"/>
+          </a:ln>
+        </p:spPr>
+        <p:style>
+          <a:lnRef idx="2">
+            <a:schemeClr val="dk1"/>
+          </a:lnRef>
+          <a:fillRef idx="0">
+            <a:schemeClr val="dk1"/>
+          </a:fillRef>
+          <a:effectRef idx="1">
+            <a:schemeClr val="dk1"/>
+          </a:effectRef>
+          <a:fontRef idx="minor">
+            <a:schemeClr val="tx1"/>
+          </a:fontRef>
+        </p:style>
+      </p:cxnSp>
+      <p:cxnSp>
+        <p:nvCxnSpPr>
+          <p:cNvPr id="14" name="Straight Arrow Connector 13"/>
+          <p:cNvCxnSpPr/>
+          <p:nvPr/>
+        </p:nvCxnSpPr>
+        <p:spPr>
+          <a:xfrm flipV="1">
+            <a:off x="5497688" y="3090333"/>
+            <a:ext cx="1199444" cy="1"/>
+          </a:xfrm>
+          <a:prstGeom prst="straightConnector1">
+            <a:avLst/>
+          </a:prstGeom>
+          <a:ln>
+            <a:prstDash val="dash"/>
+            <a:tailEnd type="arrow"/>
+          </a:ln>
+        </p:spPr>
+        <p:style>
+          <a:lnRef idx="2">
+            <a:schemeClr val="dk1"/>
+          </a:lnRef>
+          <a:fillRef idx="0">
+            <a:schemeClr val="dk1"/>
+          </a:fillRef>
+          <a:effectRef idx="1">
+            <a:schemeClr val="dk1"/>
+          </a:effectRef>
+          <a:fontRef idx="minor">
+            <a:schemeClr val="tx1"/>
+          </a:fontRef>
+        </p:style>
+      </p:cxnSp>
+      <p:sp>
+        <p:nvSpPr>
+          <p:cNvPr id="20" name="TextBox 19"/>
+          <p:cNvSpPr txBox="1"/>
+          <p:nvPr/>
+        </p:nvSpPr>
+        <p:spPr>
+          <a:xfrm>
+            <a:off x="5656371" y="1769544"/>
+            <a:ext cx="987777" cy="307777"/>
+          </a:xfrm>
+          <a:prstGeom prst="rect">
+            <a:avLst/>
+          </a:prstGeom>
+          <a:noFill/>
+        </p:spPr>
+        <p:txBody>
+          <a:bodyPr wrap="square" rtlCol="0">
+            <a:spAutoFit/>
+          </a:bodyPr>
+          <a:lstStyle/>
+          <a:p>
+            <a:r>
+              <a:rPr lang="en-US" sz="1400"/>
+              <a:t>observe</a:t>
+            </a:r>
+          </a:p>
+        </p:txBody>
+      </p:sp>
+      <p:sp>
+        <p:nvSpPr>
+          <p:cNvPr id="22" name="TextBox 21"/>
+          <p:cNvSpPr txBox="1"/>
+          <p:nvPr/>
+        </p:nvSpPr>
+        <p:spPr>
+          <a:xfrm>
+            <a:off x="5656371" y="2709176"/>
+            <a:ext cx="987777" cy="307777"/>
+          </a:xfrm>
+          <a:prstGeom prst="rect">
+            <a:avLst/>
+          </a:prstGeom>
+          <a:noFill/>
+        </p:spPr>
+        <p:txBody>
+          <a:bodyPr wrap="square" rtlCol="0">
+            <a:spAutoFit/>
+          </a:bodyPr>
+          <a:lstStyle/>
+          <a:p>
+            <a:r>
+              <a:rPr lang="en-US" sz="1400"/>
+              <a:t>observe</a:t>
+            </a:r>
+          </a:p>
+        </p:txBody>
+      </p:sp>
+      <p:cxnSp>
+        <p:nvCxnSpPr>
+          <p:cNvPr id="23" name="Straight Arrow Connector 22"/>
+          <p:cNvCxnSpPr/>
+          <p:nvPr/>
+        </p:nvCxnSpPr>
+        <p:spPr>
+          <a:xfrm>
+            <a:off x="2342444" y="2187222"/>
+            <a:ext cx="625121" cy="0"/>
+          </a:xfrm>
+          <a:prstGeom prst="straightConnector1">
+            <a:avLst/>
+          </a:prstGeom>
+          <a:ln>
+            <a:headEnd type="arrow" w="lg" len="med"/>
+            <a:tailEnd type="arrow" w="lg" len="med"/>
+          </a:ln>
+        </p:spPr>
+        <p:style>
+          <a:lnRef idx="2">
+            <a:schemeClr val="dk1"/>
+          </a:lnRef>
+          <a:fillRef idx="0">
+            <a:schemeClr val="dk1"/>
+          </a:fillRef>
+          <a:effectRef idx="1">
+            <a:schemeClr val="dk1"/>
+          </a:effectRef>
+          <a:fontRef idx="minor">
+            <a:schemeClr val="tx1"/>
+          </a:fontRef>
+        </p:style>
+      </p:cxnSp>
+      <p:cxnSp>
+        <p:nvCxnSpPr>
+          <p:cNvPr id="25" name="Straight Arrow Connector 24"/>
+          <p:cNvCxnSpPr/>
+          <p:nvPr/>
+        </p:nvCxnSpPr>
+        <p:spPr>
+          <a:xfrm>
+            <a:off x="2342444" y="3129845"/>
+            <a:ext cx="625121" cy="0"/>
+          </a:xfrm>
+          <a:prstGeom prst="straightConnector1">
+            <a:avLst/>
+          </a:prstGeom>
+          <a:ln>
+            <a:headEnd type="arrow" w="lg" len="med"/>
+            <a:tailEnd type="arrow" w="lg" len="med"/>
+          </a:ln>
+        </p:spPr>
+        <p:style>
+          <a:lnRef idx="2">
+            <a:schemeClr val="dk1"/>
+          </a:lnRef>
+          <a:fillRef idx="0">
+            <a:schemeClr val="dk1"/>
+          </a:fillRef>
+          <a:effectRef idx="1">
+            <a:schemeClr val="dk1"/>
+          </a:effectRef>
+          <a:fontRef idx="minor">
+            <a:schemeClr val="tx1"/>
+          </a:fontRef>
+        </p:style>
+      </p:cxnSp>
+    </p:spTree>
+    <p:extLst>
+      <p:ext uri="{BB962C8B-B14F-4D97-AF65-F5344CB8AC3E}">
+        <p14:creationId xmlns:p14="http://schemas.microsoft.com/office/powerpoint/2010/main" val="4166522519"/>
       </p:ext>
     </p:extLst>
   </p:cSld>

</xml_diff>